<commit_message>
Updates to status window icons, added color bar jpgs, second line added to x: y: z: DataView now does ruler calculation, RECT updating, and CALC on mouse up event
</commit_message>
<xml_diff>
--- a/oma2/oma2 graphics.pptx
+++ b/oma2/oma2 graphics.pptx
@@ -288,7 +288,7 @@
           <a:p>
             <a:fld id="{098BF284-3729-854F-9CD0-87C77B81190D}" type="datetimeFigureOut">
               <a:rPr lang="en-US" smtClean="0"/>
-              <a:t>3/22/12</a:t>
+              <a:t>7/2/12</a:t>
             </a:fld>
             <a:endParaRPr lang="en-US"/>
           </a:p>
@@ -458,7 +458,7 @@
           <a:p>
             <a:fld id="{098BF284-3729-854F-9CD0-87C77B81190D}" type="datetimeFigureOut">
               <a:rPr lang="en-US" smtClean="0"/>
-              <a:t>3/22/12</a:t>
+              <a:t>7/2/12</a:t>
             </a:fld>
             <a:endParaRPr lang="en-US"/>
           </a:p>
@@ -638,7 +638,7 @@
           <a:p>
             <a:fld id="{098BF284-3729-854F-9CD0-87C77B81190D}" type="datetimeFigureOut">
               <a:rPr lang="en-US" smtClean="0"/>
-              <a:t>3/22/12</a:t>
+              <a:t>7/2/12</a:t>
             </a:fld>
             <a:endParaRPr lang="en-US"/>
           </a:p>
@@ -808,7 +808,7 @@
           <a:p>
             <a:fld id="{098BF284-3729-854F-9CD0-87C77B81190D}" type="datetimeFigureOut">
               <a:rPr lang="en-US" smtClean="0"/>
-              <a:t>3/22/12</a:t>
+              <a:t>7/2/12</a:t>
             </a:fld>
             <a:endParaRPr lang="en-US"/>
           </a:p>
@@ -1054,7 +1054,7 @@
           <a:p>
             <a:fld id="{098BF284-3729-854F-9CD0-87C77B81190D}" type="datetimeFigureOut">
               <a:rPr lang="en-US" smtClean="0"/>
-              <a:t>3/22/12</a:t>
+              <a:t>7/2/12</a:t>
             </a:fld>
             <a:endParaRPr lang="en-US"/>
           </a:p>
@@ -1342,7 +1342,7 @@
           <a:p>
             <a:fld id="{098BF284-3729-854F-9CD0-87C77B81190D}" type="datetimeFigureOut">
               <a:rPr lang="en-US" smtClean="0"/>
-              <a:t>3/22/12</a:t>
+              <a:t>7/2/12</a:t>
             </a:fld>
             <a:endParaRPr lang="en-US"/>
           </a:p>
@@ -1764,7 +1764,7 @@
           <a:p>
             <a:fld id="{098BF284-3729-854F-9CD0-87C77B81190D}" type="datetimeFigureOut">
               <a:rPr lang="en-US" smtClean="0"/>
-              <a:t>3/22/12</a:t>
+              <a:t>7/2/12</a:t>
             </a:fld>
             <a:endParaRPr lang="en-US"/>
           </a:p>
@@ -1882,7 +1882,7 @@
           <a:p>
             <a:fld id="{098BF284-3729-854F-9CD0-87C77B81190D}" type="datetimeFigureOut">
               <a:rPr lang="en-US" smtClean="0"/>
-              <a:t>3/22/12</a:t>
+              <a:t>7/2/12</a:t>
             </a:fld>
             <a:endParaRPr lang="en-US"/>
           </a:p>
@@ -1977,7 +1977,7 @@
           <a:p>
             <a:fld id="{098BF284-3729-854F-9CD0-87C77B81190D}" type="datetimeFigureOut">
               <a:rPr lang="en-US" smtClean="0"/>
-              <a:t>3/22/12</a:t>
+              <a:t>7/2/12</a:t>
             </a:fld>
             <a:endParaRPr lang="en-US"/>
           </a:p>
@@ -2254,7 +2254,7 @@
           <a:p>
             <a:fld id="{098BF284-3729-854F-9CD0-87C77B81190D}" type="datetimeFigureOut">
               <a:rPr lang="en-US" smtClean="0"/>
-              <a:t>3/22/12</a:t>
+              <a:t>7/2/12</a:t>
             </a:fld>
             <a:endParaRPr lang="en-US"/>
           </a:p>
@@ -2507,7 +2507,7 @@
           <a:p>
             <a:fld id="{098BF284-3729-854F-9CD0-87C77B81190D}" type="datetimeFigureOut">
               <a:rPr lang="en-US" smtClean="0"/>
-              <a:t>3/22/12</a:t>
+              <a:t>7/2/12</a:t>
             </a:fld>
             <a:endParaRPr lang="en-US"/>
           </a:p>
@@ -2720,7 +2720,7 @@
           <a:p>
             <a:fld id="{098BF284-3729-854F-9CD0-87C77B81190D}" type="datetimeFigureOut">
               <a:rPr lang="en-US" smtClean="0"/>
-              <a:t>3/22/12</a:t>
+              <a:t>7/2/12</a:t>
             </a:fld>
             <a:endParaRPr lang="en-US"/>
           </a:p>
@@ -3113,6 +3113,7 @@
               <a:gd name="adj3" fmla="val 24469"/>
             </a:avLst>
           </a:prstGeom>
+          <a:effectLst/>
         </p:spPr>
         <p:style>
           <a:lnRef idx="1">
@@ -3176,6 +3177,625 @@
                 <a:schemeClr val="tx1"/>
               </a:solidFill>
             </a:endParaRPr>
+          </a:p>
+        </p:txBody>
+      </p:sp>
+      <p:sp>
+        <p:nvSpPr>
+          <p:cNvPr id="6" name="Frame 5"/>
+          <p:cNvSpPr/>
+          <p:nvPr/>
+        </p:nvSpPr>
+        <p:spPr>
+          <a:xfrm>
+            <a:off x="4635500" y="1854673"/>
+            <a:ext cx="273050" cy="274320"/>
+          </a:xfrm>
+          <a:prstGeom prst="frame">
+            <a:avLst/>
+          </a:prstGeom>
+          <a:effectLst/>
+        </p:spPr>
+        <p:style>
+          <a:lnRef idx="1">
+            <a:schemeClr val="accent1"/>
+          </a:lnRef>
+          <a:fillRef idx="3">
+            <a:schemeClr val="accent1"/>
+          </a:fillRef>
+          <a:effectRef idx="2">
+            <a:schemeClr val="accent1"/>
+          </a:effectRef>
+          <a:fontRef idx="minor">
+            <a:schemeClr val="lt1"/>
+          </a:fontRef>
+        </p:style>
+        <p:txBody>
+          <a:bodyPr rtlCol="0" anchor="ctr"/>
+          <a:lstStyle/>
+          <a:p>
+            <a:pPr algn="ctr"/>
+            <a:endParaRPr lang="en-US" dirty="0">
+              <a:solidFill>
+                <a:schemeClr val="tx1"/>
+              </a:solidFill>
+            </a:endParaRPr>
+          </a:p>
+        </p:txBody>
+      </p:sp>
+      <p:sp>
+        <p:nvSpPr>
+          <p:cNvPr id="2" name="TextBox 1"/>
+          <p:cNvSpPr txBox="1"/>
+          <p:nvPr/>
+        </p:nvSpPr>
+        <p:spPr>
+          <a:xfrm>
+            <a:off x="4641850" y="1841973"/>
+            <a:ext cx="266720" cy="276999"/>
+          </a:xfrm>
+          <a:prstGeom prst="rect">
+            <a:avLst/>
+          </a:prstGeom>
+          <a:noFill/>
+        </p:spPr>
+        <p:txBody>
+          <a:bodyPr wrap="none" rtlCol="0">
+            <a:spAutoFit/>
+          </a:bodyPr>
+          <a:lstStyle/>
+          <a:p>
+            <a:r>
+              <a:rPr lang="en-US" sz="1200" dirty="0" smtClean="0"/>
+              <a:t>C</a:t>
+            </a:r>
+            <a:endParaRPr lang="en-US" sz="1200" dirty="0"/>
+          </a:p>
+        </p:txBody>
+      </p:sp>
+      <p:sp>
+        <p:nvSpPr>
+          <p:cNvPr id="3" name="TextBox 2"/>
+          <p:cNvSpPr txBox="1"/>
+          <p:nvPr/>
+        </p:nvSpPr>
+        <p:spPr>
+          <a:xfrm>
+            <a:off x="4451350" y="603250"/>
+            <a:ext cx="3211636" cy="369332"/>
+          </a:xfrm>
+          <a:prstGeom prst="rect">
+            <a:avLst/>
+          </a:prstGeom>
+          <a:noFill/>
+        </p:spPr>
+        <p:txBody>
+          <a:bodyPr wrap="none" rtlCol="0">
+            <a:spAutoFit/>
+          </a:bodyPr>
+          <a:lstStyle/>
+          <a:p>
+            <a:r>
+              <a:rPr lang="en-US" dirty="0" smtClean="0"/>
+              <a:t>Save as 300 dpi jpeg, no shadow</a:t>
+            </a:r>
+            <a:endParaRPr lang="en-US" dirty="0"/>
+          </a:p>
+        </p:txBody>
+      </p:sp>
+      <p:pic>
+        <p:nvPicPr>
+          <p:cNvPr id="7" name="Picture 6"/>
+          <p:cNvPicPr>
+            <a:picLocks noChangeAspect="1"/>
+          </p:cNvPicPr>
+          <p:nvPr/>
+        </p:nvPicPr>
+        <p:blipFill>
+          <a:blip r:embed="rId2">
+            <a:duotone>
+              <a:prstClr val="black"/>
+              <a:schemeClr val="accent5">
+                <a:tint val="45000"/>
+                <a:satMod val="400000"/>
+              </a:schemeClr>
+            </a:duotone>
+          </a:blip>
+          <a:stretch>
+            <a:fillRect/>
+          </a:stretch>
+        </p:blipFill>
+        <p:spPr>
+          <a:xfrm flipH="1">
+            <a:off x="4008156" y="2128993"/>
+            <a:ext cx="191310" cy="491351"/>
+          </a:xfrm>
+          <a:prstGeom prst="rect">
+            <a:avLst/>
+          </a:prstGeom>
+        </p:spPr>
+      </p:pic>
+      <p:cxnSp>
+        <p:nvCxnSpPr>
+          <p:cNvPr id="9" name="Straight Connector 8"/>
+          <p:cNvCxnSpPr/>
+          <p:nvPr/>
+        </p:nvCxnSpPr>
+        <p:spPr>
+          <a:xfrm flipH="1">
+            <a:off x="5126567" y="1854673"/>
+            <a:ext cx="4233" cy="274320"/>
+          </a:xfrm>
+          <a:prstGeom prst="line">
+            <a:avLst/>
+          </a:prstGeom>
+          <a:ln>
+            <a:solidFill>
+              <a:srgbClr val="4F81BD"/>
+            </a:solidFill>
+          </a:ln>
+          <a:effectLst/>
+        </p:spPr>
+        <p:style>
+          <a:lnRef idx="2">
+            <a:schemeClr val="accent1"/>
+          </a:lnRef>
+          <a:fillRef idx="0">
+            <a:schemeClr val="accent1"/>
+          </a:fillRef>
+          <a:effectRef idx="1">
+            <a:schemeClr val="accent1"/>
+          </a:effectRef>
+          <a:fontRef idx="minor">
+            <a:schemeClr val="tx1"/>
+          </a:fontRef>
+        </p:style>
+      </p:cxnSp>
+      <p:cxnSp>
+        <p:nvCxnSpPr>
+          <p:cNvPr id="11" name="Straight Connector 10"/>
+          <p:cNvCxnSpPr/>
+          <p:nvPr/>
+        </p:nvCxnSpPr>
+        <p:spPr>
+          <a:xfrm>
+            <a:off x="5122334" y="1858906"/>
+            <a:ext cx="93133" cy="0"/>
+          </a:xfrm>
+          <a:prstGeom prst="line">
+            <a:avLst/>
+          </a:prstGeom>
+          <a:ln>
+            <a:solidFill>
+              <a:srgbClr val="4F81BD"/>
+            </a:solidFill>
+          </a:ln>
+          <a:effectLst/>
+        </p:spPr>
+        <p:style>
+          <a:lnRef idx="2">
+            <a:schemeClr val="accent1"/>
+          </a:lnRef>
+          <a:fillRef idx="0">
+            <a:schemeClr val="accent1"/>
+          </a:fillRef>
+          <a:effectRef idx="1">
+            <a:schemeClr val="accent1"/>
+          </a:effectRef>
+          <a:fontRef idx="minor">
+            <a:schemeClr val="tx1"/>
+          </a:fontRef>
+        </p:style>
+      </p:cxnSp>
+      <p:cxnSp>
+        <p:nvCxnSpPr>
+          <p:cNvPr id="12" name="Straight Connector 11"/>
+          <p:cNvCxnSpPr/>
+          <p:nvPr/>
+        </p:nvCxnSpPr>
+        <p:spPr>
+          <a:xfrm>
+            <a:off x="5122334" y="2118972"/>
+            <a:ext cx="93133" cy="0"/>
+          </a:xfrm>
+          <a:prstGeom prst="line">
+            <a:avLst/>
+          </a:prstGeom>
+          <a:ln>
+            <a:solidFill>
+              <a:srgbClr val="4F81BD"/>
+            </a:solidFill>
+          </a:ln>
+          <a:effectLst/>
+        </p:spPr>
+        <p:style>
+          <a:lnRef idx="2">
+            <a:schemeClr val="accent1"/>
+          </a:lnRef>
+          <a:fillRef idx="0">
+            <a:schemeClr val="accent1"/>
+          </a:fillRef>
+          <a:effectRef idx="1">
+            <a:schemeClr val="accent1"/>
+          </a:effectRef>
+          <a:fontRef idx="minor">
+            <a:schemeClr val="tx1"/>
+          </a:fontRef>
+        </p:style>
+      </p:cxnSp>
+      <p:cxnSp>
+        <p:nvCxnSpPr>
+          <p:cNvPr id="13" name="Straight Connector 12"/>
+          <p:cNvCxnSpPr/>
+          <p:nvPr/>
+        </p:nvCxnSpPr>
+        <p:spPr>
+          <a:xfrm>
+            <a:off x="5126567" y="1923923"/>
+            <a:ext cx="55033" cy="0"/>
+          </a:xfrm>
+          <a:prstGeom prst="line">
+            <a:avLst/>
+          </a:prstGeom>
+          <a:ln w="19050" cmpd="sng">
+            <a:solidFill>
+              <a:srgbClr val="4F81BD"/>
+            </a:solidFill>
+          </a:ln>
+          <a:effectLst/>
+        </p:spPr>
+        <p:style>
+          <a:lnRef idx="2">
+            <a:schemeClr val="accent1"/>
+          </a:lnRef>
+          <a:fillRef idx="0">
+            <a:schemeClr val="accent1"/>
+          </a:fillRef>
+          <a:effectRef idx="1">
+            <a:schemeClr val="accent1"/>
+          </a:effectRef>
+          <a:fontRef idx="minor">
+            <a:schemeClr val="tx1"/>
+          </a:fontRef>
+        </p:style>
+      </p:cxnSp>
+      <p:cxnSp>
+        <p:nvCxnSpPr>
+          <p:cNvPr id="15" name="Straight Connector 14"/>
+          <p:cNvCxnSpPr/>
+          <p:nvPr/>
+        </p:nvCxnSpPr>
+        <p:spPr>
+          <a:xfrm>
+            <a:off x="5126567" y="2053957"/>
+            <a:ext cx="55033" cy="0"/>
+          </a:xfrm>
+          <a:prstGeom prst="line">
+            <a:avLst/>
+          </a:prstGeom>
+          <a:ln w="19050" cmpd="sng">
+            <a:solidFill>
+              <a:srgbClr val="4F81BD"/>
+            </a:solidFill>
+          </a:ln>
+          <a:effectLst/>
+        </p:spPr>
+        <p:style>
+          <a:lnRef idx="2">
+            <a:schemeClr val="accent1"/>
+          </a:lnRef>
+          <a:fillRef idx="0">
+            <a:schemeClr val="accent1"/>
+          </a:fillRef>
+          <a:effectRef idx="1">
+            <a:schemeClr val="accent1"/>
+          </a:effectRef>
+          <a:fontRef idx="minor">
+            <a:schemeClr val="tx1"/>
+          </a:fontRef>
+        </p:style>
+      </p:cxnSp>
+      <p:cxnSp>
+        <p:nvCxnSpPr>
+          <p:cNvPr id="17" name="Straight Connector 16"/>
+          <p:cNvCxnSpPr/>
+          <p:nvPr/>
+        </p:nvCxnSpPr>
+        <p:spPr>
+          <a:xfrm>
+            <a:off x="5122334" y="1988940"/>
+            <a:ext cx="93133" cy="0"/>
+          </a:xfrm>
+          <a:prstGeom prst="line">
+            <a:avLst/>
+          </a:prstGeom>
+          <a:ln>
+            <a:solidFill>
+              <a:srgbClr val="4F81BD"/>
+            </a:solidFill>
+          </a:ln>
+          <a:effectLst/>
+        </p:spPr>
+        <p:style>
+          <a:lnRef idx="2">
+            <a:schemeClr val="accent1"/>
+          </a:lnRef>
+          <a:fillRef idx="0">
+            <a:schemeClr val="accent1"/>
+          </a:fillRef>
+          <a:effectRef idx="1">
+            <a:schemeClr val="accent1"/>
+          </a:effectRef>
+          <a:fontRef idx="minor">
+            <a:schemeClr val="tx1"/>
+          </a:fontRef>
+        </p:style>
+      </p:cxnSp>
+      <p:sp>
+        <p:nvSpPr>
+          <p:cNvPr id="18" name="Frame 17"/>
+          <p:cNvSpPr/>
+          <p:nvPr/>
+        </p:nvSpPr>
+        <p:spPr>
+          <a:xfrm>
+            <a:off x="4641850" y="1299683"/>
+            <a:ext cx="273050" cy="274320"/>
+          </a:xfrm>
+          <a:prstGeom prst="frame">
+            <a:avLst/>
+          </a:prstGeom>
+          <a:ln>
+            <a:solidFill>
+              <a:srgbClr val="4F81BD"/>
+            </a:solidFill>
+          </a:ln>
+          <a:effectLst/>
+        </p:spPr>
+        <p:style>
+          <a:lnRef idx="1">
+            <a:schemeClr val="accent1"/>
+          </a:lnRef>
+          <a:fillRef idx="3">
+            <a:schemeClr val="accent1"/>
+          </a:fillRef>
+          <a:effectRef idx="2">
+            <a:schemeClr val="accent1"/>
+          </a:effectRef>
+          <a:fontRef idx="minor">
+            <a:schemeClr val="lt1"/>
+          </a:fontRef>
+        </p:style>
+        <p:txBody>
+          <a:bodyPr rtlCol="0" anchor="ctr"/>
+          <a:lstStyle/>
+          <a:p>
+            <a:pPr algn="ctr"/>
+            <a:endParaRPr lang="en-US">
+              <a:solidFill>
+                <a:schemeClr val="tx1"/>
+              </a:solidFill>
+            </a:endParaRPr>
+          </a:p>
+        </p:txBody>
+      </p:sp>
+      <p:cxnSp>
+        <p:nvCxnSpPr>
+          <p:cNvPr id="19" name="Straight Connector 18"/>
+          <p:cNvCxnSpPr/>
+          <p:nvPr/>
+        </p:nvCxnSpPr>
+        <p:spPr>
+          <a:xfrm flipH="1">
+            <a:off x="5088467" y="1299683"/>
+            <a:ext cx="4233" cy="274320"/>
+          </a:xfrm>
+          <a:prstGeom prst="line">
+            <a:avLst/>
+          </a:prstGeom>
+          <a:ln>
+            <a:solidFill>
+              <a:srgbClr val="4F81BD"/>
+            </a:solidFill>
+          </a:ln>
+          <a:effectLst/>
+        </p:spPr>
+        <p:style>
+          <a:lnRef idx="2">
+            <a:schemeClr val="accent1"/>
+          </a:lnRef>
+          <a:fillRef idx="0">
+            <a:schemeClr val="accent1"/>
+          </a:fillRef>
+          <a:effectRef idx="1">
+            <a:schemeClr val="accent1"/>
+          </a:effectRef>
+          <a:fontRef idx="minor">
+            <a:schemeClr val="tx1"/>
+          </a:fontRef>
+        </p:style>
+      </p:cxnSp>
+      <p:cxnSp>
+        <p:nvCxnSpPr>
+          <p:cNvPr id="27" name="Straight Connector 26"/>
+          <p:cNvCxnSpPr/>
+          <p:nvPr/>
+        </p:nvCxnSpPr>
+        <p:spPr>
+          <a:xfrm rot="5400000" flipH="1">
+            <a:off x="5223935" y="1426685"/>
+            <a:ext cx="4233" cy="274320"/>
+          </a:xfrm>
+          <a:prstGeom prst="line">
+            <a:avLst/>
+          </a:prstGeom>
+          <a:ln>
+            <a:solidFill>
+              <a:srgbClr val="4F81BD"/>
+            </a:solidFill>
+          </a:ln>
+          <a:effectLst/>
+        </p:spPr>
+        <p:style>
+          <a:lnRef idx="2">
+            <a:schemeClr val="accent1"/>
+          </a:lnRef>
+          <a:fillRef idx="0">
+            <a:schemeClr val="accent1"/>
+          </a:fillRef>
+          <a:effectRef idx="1">
+            <a:schemeClr val="accent1"/>
+          </a:effectRef>
+          <a:fontRef idx="minor">
+            <a:schemeClr val="tx1"/>
+          </a:fontRef>
+        </p:style>
+      </p:cxnSp>
+      <p:sp>
+        <p:nvSpPr>
+          <p:cNvPr id="28" name="Freeform 27"/>
+          <p:cNvSpPr/>
+          <p:nvPr/>
+        </p:nvSpPr>
+        <p:spPr>
+          <a:xfrm>
+            <a:off x="5113867" y="1347762"/>
+            <a:ext cx="267257" cy="149457"/>
+          </a:xfrm>
+          <a:custGeom>
+            <a:avLst/>
+            <a:gdLst>
+              <a:gd name="connsiteX0" fmla="*/ 0 w 267257"/>
+              <a:gd name="connsiteY0" fmla="*/ 91571 h 149457"/>
+              <a:gd name="connsiteX1" fmla="*/ 46566 w 267257"/>
+              <a:gd name="connsiteY1" fmla="*/ 28071 h 149457"/>
+              <a:gd name="connsiteX2" fmla="*/ 88900 w 267257"/>
+              <a:gd name="connsiteY2" fmla="*/ 2671 h 149457"/>
+              <a:gd name="connsiteX3" fmla="*/ 110066 w 267257"/>
+              <a:gd name="connsiteY3" fmla="*/ 2671 h 149457"/>
+              <a:gd name="connsiteX4" fmla="*/ 143933 w 267257"/>
+              <a:gd name="connsiteY4" fmla="*/ 19605 h 149457"/>
+              <a:gd name="connsiteX5" fmla="*/ 160866 w 267257"/>
+              <a:gd name="connsiteY5" fmla="*/ 53471 h 149457"/>
+              <a:gd name="connsiteX6" fmla="*/ 194733 w 267257"/>
+              <a:gd name="connsiteY6" fmla="*/ 112738 h 149457"/>
+              <a:gd name="connsiteX7" fmla="*/ 224366 w 267257"/>
+              <a:gd name="connsiteY7" fmla="*/ 146605 h 149457"/>
+              <a:gd name="connsiteX8" fmla="*/ 262466 w 267257"/>
+              <a:gd name="connsiteY8" fmla="*/ 146605 h 149457"/>
+              <a:gd name="connsiteX9" fmla="*/ 266700 w 267257"/>
+              <a:gd name="connsiteY9" fmla="*/ 138138 h 149457"/>
+            </a:gdLst>
+            <a:ahLst/>
+            <a:cxnLst>
+              <a:cxn ang="0">
+                <a:pos x="connsiteX0" y="connsiteY0"/>
+              </a:cxn>
+              <a:cxn ang="0">
+                <a:pos x="connsiteX1" y="connsiteY1"/>
+              </a:cxn>
+              <a:cxn ang="0">
+                <a:pos x="connsiteX2" y="connsiteY2"/>
+              </a:cxn>
+              <a:cxn ang="0">
+                <a:pos x="connsiteX3" y="connsiteY3"/>
+              </a:cxn>
+              <a:cxn ang="0">
+                <a:pos x="connsiteX4" y="connsiteY4"/>
+              </a:cxn>
+              <a:cxn ang="0">
+                <a:pos x="connsiteX5" y="connsiteY5"/>
+              </a:cxn>
+              <a:cxn ang="0">
+                <a:pos x="connsiteX6" y="connsiteY6"/>
+              </a:cxn>
+              <a:cxn ang="0">
+                <a:pos x="connsiteX7" y="connsiteY7"/>
+              </a:cxn>
+              <a:cxn ang="0">
+                <a:pos x="connsiteX8" y="connsiteY8"/>
+              </a:cxn>
+              <a:cxn ang="0">
+                <a:pos x="connsiteX9" y="connsiteY9"/>
+              </a:cxn>
+            </a:cxnLst>
+            <a:rect l="l" t="t" r="r" b="b"/>
+            <a:pathLst>
+              <a:path w="267257" h="149457">
+                <a:moveTo>
+                  <a:pt x="0" y="91571"/>
+                </a:moveTo>
+                <a:cubicBezTo>
+                  <a:pt x="15874" y="67229"/>
+                  <a:pt x="31749" y="42888"/>
+                  <a:pt x="46566" y="28071"/>
+                </a:cubicBezTo>
+                <a:cubicBezTo>
+                  <a:pt x="61383" y="13254"/>
+                  <a:pt x="78317" y="6904"/>
+                  <a:pt x="88900" y="2671"/>
+                </a:cubicBezTo>
+                <a:cubicBezTo>
+                  <a:pt x="99483" y="-1562"/>
+                  <a:pt x="100894" y="-151"/>
+                  <a:pt x="110066" y="2671"/>
+                </a:cubicBezTo>
+                <a:cubicBezTo>
+                  <a:pt x="119238" y="5493"/>
+                  <a:pt x="135466" y="11138"/>
+                  <a:pt x="143933" y="19605"/>
+                </a:cubicBezTo>
+                <a:cubicBezTo>
+                  <a:pt x="152400" y="28072"/>
+                  <a:pt x="152399" y="37949"/>
+                  <a:pt x="160866" y="53471"/>
+                </a:cubicBezTo>
+                <a:cubicBezTo>
+                  <a:pt x="169333" y="68993"/>
+                  <a:pt x="184150" y="97216"/>
+                  <a:pt x="194733" y="112738"/>
+                </a:cubicBezTo>
+                <a:cubicBezTo>
+                  <a:pt x="205316" y="128260"/>
+                  <a:pt x="213077" y="140961"/>
+                  <a:pt x="224366" y="146605"/>
+                </a:cubicBezTo>
+                <a:cubicBezTo>
+                  <a:pt x="235655" y="152249"/>
+                  <a:pt x="255410" y="148016"/>
+                  <a:pt x="262466" y="146605"/>
+                </a:cubicBezTo>
+                <a:cubicBezTo>
+                  <a:pt x="269522" y="145194"/>
+                  <a:pt x="266700" y="138138"/>
+                  <a:pt x="266700" y="138138"/>
+                </a:cubicBezTo>
+              </a:path>
+            </a:pathLst>
+          </a:custGeom>
+          <a:ln w="28575" cmpd="sng"/>
+          <a:effectLst/>
+        </p:spPr>
+        <p:style>
+          <a:lnRef idx="2">
+            <a:schemeClr val="dk1"/>
+          </a:lnRef>
+          <a:fillRef idx="0">
+            <a:schemeClr val="dk1"/>
+          </a:fillRef>
+          <a:effectRef idx="1">
+            <a:schemeClr val="dk1"/>
+          </a:effectRef>
+          <a:fontRef idx="minor">
+            <a:schemeClr val="tx1"/>
+          </a:fontRef>
+        </p:style>
+        <p:txBody>
+          <a:bodyPr rtlCol="0" anchor="ctr"/>
+          <a:lstStyle/>
+          <a:p>
+            <a:pPr algn="ctr"/>
+            <a:endParaRPr lang="en-US"/>
           </a:p>
         </p:txBody>
       </p:sp>

</xml_diff>